<commit_message>
Names on Power Point
</commit_message>
<xml_diff>
--- a/BSaOR.pptx
+++ b/BSaOR.pptx
@@ -2506,19 +2506,19 @@
     </dgm:pt>
   </dgm:ptLst>
   <dgm:cxnLst>
-    <dgm:cxn modelId="{57568EC9-AC0E-47EE-9902-3696EDE4CBA1}" srcId="{F6EE7851-C99E-42E1-A7E5-87ECB45249D4}" destId="{F52AEB3E-45CE-4BCC-B453-6CAC410E04D7}" srcOrd="0" destOrd="0" parTransId="{A2F4F577-082A-425F-9DE2-A36D9DEF96C0}" sibTransId="{AC0D94FE-1DDF-4AF1-A20C-22C856948A85}"/>
-    <dgm:cxn modelId="{8400634A-2BE8-4D31-9609-D2F6A8EA8B8A}" srcId="{6F7B9366-2E62-4DA4-9CD1-1A82ABBA0760}" destId="{3D00C8E7-397E-452F-A16C-13089AAE4B0F}" srcOrd="0" destOrd="0" parTransId="{BFFDA095-DDC3-45F0-931F-EAC23DEFBB49}" sibTransId="{642BE7B0-1AA5-490E-A7F8-702DD25DE771}"/>
-    <dgm:cxn modelId="{3669D24A-DA0C-43B0-A748-11FDA113C41D}" type="presOf" srcId="{6F7B9366-2E62-4DA4-9CD1-1A82ABBA0760}" destId="{A4347F6C-0A0A-4C7F-BCA3-CFF69CD72302}" srcOrd="0" destOrd="0" presId="urn:microsoft.com/office/officeart/2009/3/layout/IncreasingArrowsProcess"/>
     <dgm:cxn modelId="{EC535102-454B-4F58-AD9E-A9C1B44F70A1}" type="presOf" srcId="{1A114840-A098-44F1-A1E8-A5DDE946BE98}" destId="{A3166FD1-E3E1-46A0-8054-8C8615213FC8}" srcOrd="0" destOrd="0" presId="urn:microsoft.com/office/officeart/2009/3/layout/IncreasingArrowsProcess"/>
+    <dgm:cxn modelId="{7FDFAC02-6E6E-4957-BE69-9680AC216157}" type="presOf" srcId="{3D00C8E7-397E-452F-A16C-13089AAE4B0F}" destId="{8185930C-B68A-44A9-AF48-591104627F6E}" srcOrd="0" destOrd="0" presId="urn:microsoft.com/office/officeart/2009/3/layout/IncreasingArrowsProcess"/>
     <dgm:cxn modelId="{225084B4-119E-4502-92A9-7D550E803704}" type="presOf" srcId="{BD775359-AE06-4F41-A561-6CD161F3FB51}" destId="{55580990-C586-4337-B3E2-F658C853F9DF}" srcOrd="0" destOrd="0" presId="urn:microsoft.com/office/officeart/2009/3/layout/IncreasingArrowsProcess"/>
-    <dgm:cxn modelId="{DB544C50-BF21-445D-AEE3-6E680DC9A813}" srcId="{6F7B9366-2E62-4DA4-9CD1-1A82ABBA0760}" destId="{F26D9AB4-87B3-47E2-BC7A-F73CB96CD5FA}" srcOrd="2" destOrd="0" parTransId="{A6AA4C81-A2B2-482E-AB7D-F7E1294D0442}" sibTransId="{10761EAD-B78E-466A-9FDC-3B625B99437D}"/>
     <dgm:cxn modelId="{30E5C2A5-4509-41FB-AAD0-448CAC345615}" srcId="{3D00C8E7-397E-452F-A16C-13089AAE4B0F}" destId="{1A114840-A098-44F1-A1E8-A5DDE946BE98}" srcOrd="0" destOrd="0" parTransId="{DCD6E51F-4EB8-4BB7-93F5-C70537641792}" sibTransId="{B5F192AC-EC16-4F33-9738-601DB03DFD79}"/>
     <dgm:cxn modelId="{7CEDF7A1-A9E4-4939-A61D-24B5E8AC3B15}" type="presOf" srcId="{F6EE7851-C99E-42E1-A7E5-87ECB45249D4}" destId="{04CC0CE8-796A-400A-AF96-B15EC4ED70F7}" srcOrd="0" destOrd="0" presId="urn:microsoft.com/office/officeart/2009/3/layout/IncreasingArrowsProcess"/>
+    <dgm:cxn modelId="{DB544C50-BF21-445D-AEE3-6E680DC9A813}" srcId="{6F7B9366-2E62-4DA4-9CD1-1A82ABBA0760}" destId="{F26D9AB4-87B3-47E2-BC7A-F73CB96CD5FA}" srcOrd="2" destOrd="0" parTransId="{A6AA4C81-A2B2-482E-AB7D-F7E1294D0442}" sibTransId="{10761EAD-B78E-466A-9FDC-3B625B99437D}"/>
+    <dgm:cxn modelId="{8ADBE089-A87E-411F-80C1-487C036F0C5F}" srcId="{F26D9AB4-87B3-47E2-BC7A-F73CB96CD5FA}" destId="{BD775359-AE06-4F41-A561-6CD161F3FB51}" srcOrd="0" destOrd="0" parTransId="{80387DA8-A5BE-46AD-873C-C5A1C662EFAD}" sibTransId="{B346D684-BF00-4E3F-A82C-0F22B1A259CF}"/>
     <dgm:cxn modelId="{2E59C4D2-65A4-4F17-85E5-3AE9A252F195}" srcId="{6F7B9366-2E62-4DA4-9CD1-1A82ABBA0760}" destId="{F6EE7851-C99E-42E1-A7E5-87ECB45249D4}" srcOrd="1" destOrd="0" parTransId="{B4110E3A-AF04-4E18-809A-6D11E21E919C}" sibTransId="{1F768B62-AB46-4702-B60D-F6D0CE2A682D}"/>
+    <dgm:cxn modelId="{8400634A-2BE8-4D31-9609-D2F6A8EA8B8A}" srcId="{6F7B9366-2E62-4DA4-9CD1-1A82ABBA0760}" destId="{3D00C8E7-397E-452F-A16C-13089AAE4B0F}" srcOrd="0" destOrd="0" parTransId="{BFFDA095-DDC3-45F0-931F-EAC23DEFBB49}" sibTransId="{642BE7B0-1AA5-490E-A7F8-702DD25DE771}"/>
+    <dgm:cxn modelId="{3107D120-F885-466C-B566-C4FCB1942EB1}" type="presOf" srcId="{F26D9AB4-87B3-47E2-BC7A-F73CB96CD5FA}" destId="{64767A4A-738D-4555-8175-45549CA72A8A}" srcOrd="0" destOrd="0" presId="urn:microsoft.com/office/officeart/2009/3/layout/IncreasingArrowsProcess"/>
+    <dgm:cxn modelId="{3669D24A-DA0C-43B0-A748-11FDA113C41D}" type="presOf" srcId="{6F7B9366-2E62-4DA4-9CD1-1A82ABBA0760}" destId="{A4347F6C-0A0A-4C7F-BCA3-CFF69CD72302}" srcOrd="0" destOrd="0" presId="urn:microsoft.com/office/officeart/2009/3/layout/IncreasingArrowsProcess"/>
     <dgm:cxn modelId="{D8FCCBFD-5C31-457F-A140-85D4B36A6DC5}" type="presOf" srcId="{F52AEB3E-45CE-4BCC-B453-6CAC410E04D7}" destId="{A89AFF3D-79BD-43DE-887E-2A4E81F7B2E2}" srcOrd="0" destOrd="0" presId="urn:microsoft.com/office/officeart/2009/3/layout/IncreasingArrowsProcess"/>
-    <dgm:cxn modelId="{7FDFAC02-6E6E-4957-BE69-9680AC216157}" type="presOf" srcId="{3D00C8E7-397E-452F-A16C-13089AAE4B0F}" destId="{8185930C-B68A-44A9-AF48-591104627F6E}" srcOrd="0" destOrd="0" presId="urn:microsoft.com/office/officeart/2009/3/layout/IncreasingArrowsProcess"/>
-    <dgm:cxn modelId="{8ADBE089-A87E-411F-80C1-487C036F0C5F}" srcId="{F26D9AB4-87B3-47E2-BC7A-F73CB96CD5FA}" destId="{BD775359-AE06-4F41-A561-6CD161F3FB51}" srcOrd="0" destOrd="0" parTransId="{80387DA8-A5BE-46AD-873C-C5A1C662EFAD}" sibTransId="{B346D684-BF00-4E3F-A82C-0F22B1A259CF}"/>
-    <dgm:cxn modelId="{3107D120-F885-466C-B566-C4FCB1942EB1}" type="presOf" srcId="{F26D9AB4-87B3-47E2-BC7A-F73CB96CD5FA}" destId="{64767A4A-738D-4555-8175-45549CA72A8A}" srcOrd="0" destOrd="0" presId="urn:microsoft.com/office/officeart/2009/3/layout/IncreasingArrowsProcess"/>
+    <dgm:cxn modelId="{57568EC9-AC0E-47EE-9902-3696EDE4CBA1}" srcId="{F6EE7851-C99E-42E1-A7E5-87ECB45249D4}" destId="{F52AEB3E-45CE-4BCC-B453-6CAC410E04D7}" srcOrd="0" destOrd="0" parTransId="{A2F4F577-082A-425F-9DE2-A36D9DEF96C0}" sibTransId="{AC0D94FE-1DDF-4AF1-A20C-22C856948A85}"/>
     <dgm:cxn modelId="{513A4A6C-E0E8-4696-8339-371A5A9246E4}" type="presParOf" srcId="{A4347F6C-0A0A-4C7F-BCA3-CFF69CD72302}" destId="{8185930C-B68A-44A9-AF48-591104627F6E}" srcOrd="0" destOrd="0" presId="urn:microsoft.com/office/officeart/2009/3/layout/IncreasingArrowsProcess"/>
     <dgm:cxn modelId="{601E7241-E4E6-4019-A38F-7C42B7F5F32F}" type="presParOf" srcId="{A4347F6C-0A0A-4C7F-BCA3-CFF69CD72302}" destId="{A3166FD1-E3E1-46A0-8054-8C8615213FC8}" srcOrd="1" destOrd="0" presId="urn:microsoft.com/office/officeart/2009/3/layout/IncreasingArrowsProcess"/>
     <dgm:cxn modelId="{27AE11B9-7752-4C96-BC9D-3C7BA279384C}" type="presParOf" srcId="{A4347F6C-0A0A-4C7F-BCA3-CFF69CD72302}" destId="{04CC0CE8-796A-400A-AF96-B15EC4ED70F7}" srcOrd="2" destOrd="0" presId="urn:microsoft.com/office/officeart/2009/3/layout/IncreasingArrowsProcess"/>
@@ -2556,495 +2556,6 @@
       <dsp:cNvGrpSpPr/>
     </dsp:nvGrpSpPr>
     <dsp:grpSpPr/>
-    <dsp:sp modelId="{8185930C-B68A-44A9-AF48-591104627F6E}">
-      <dsp:nvSpPr>
-        <dsp:cNvPr id="0" name=""/>
-        <dsp:cNvSpPr/>
-      </dsp:nvSpPr>
-      <dsp:spPr>
-        <a:xfrm>
-          <a:off x="0" y="541632"/>
-          <a:ext cx="4325257" cy="629922"/>
-        </a:xfrm>
-        <a:prstGeom prst="rightArrow">
-          <a:avLst>
-            <a:gd name="adj1" fmla="val 50000"/>
-            <a:gd name="adj2" fmla="val 50000"/>
-          </a:avLst>
-        </a:prstGeom>
-        <a:solidFill>
-          <a:schemeClr val="accent1">
-            <a:hueOff val="0"/>
-            <a:satOff val="0"/>
-            <a:lumOff val="0"/>
-            <a:alphaOff val="0"/>
-          </a:schemeClr>
-        </a:solidFill>
-        <a:ln w="15875" cap="rnd" cmpd="sng" algn="ctr">
-          <a:solidFill>
-            <a:schemeClr val="lt1">
-              <a:hueOff val="0"/>
-              <a:satOff val="0"/>
-              <a:lumOff val="0"/>
-              <a:alphaOff val="0"/>
-            </a:schemeClr>
-          </a:solidFill>
-          <a:prstDash val="solid"/>
-        </a:ln>
-        <a:effectLst/>
-      </dsp:spPr>
-      <dsp:style>
-        <a:lnRef idx="2">
-          <a:scrgbClr r="0" g="0" b="0"/>
-        </a:lnRef>
-        <a:fillRef idx="1">
-          <a:scrgbClr r="0" g="0" b="0"/>
-        </a:fillRef>
-        <a:effectRef idx="0">
-          <a:scrgbClr r="0" g="0" b="0"/>
-        </a:effectRef>
-        <a:fontRef idx="minor">
-          <a:schemeClr val="lt1"/>
-        </a:fontRef>
-      </dsp:style>
-      <dsp:txBody>
-        <a:bodyPr spcFirstLastPara="0" vert="horz" wrap="square" lIns="41910" tIns="41910" rIns="254000" bIns="100000" numCol="1" spcCol="1270" anchor="ctr" anchorCtr="0">
-          <a:noAutofit/>
-        </a:bodyPr>
-        <a:lstStyle/>
-        <a:p>
-          <a:pPr lvl="0" algn="l" defTabSz="488950">
-            <a:lnSpc>
-              <a:spcPct val="90000"/>
-            </a:lnSpc>
-            <a:spcBef>
-              <a:spcPct val="0"/>
-            </a:spcBef>
-            <a:spcAft>
-              <a:spcPct val="35000"/>
-            </a:spcAft>
-          </a:pPr>
-          <a:r>
-            <a:rPr lang="es-ES" sz="1100" kern="1200" dirty="0" smtClean="0"/>
-            <a:t>Compute </a:t>
-          </a:r>
-          <a:r>
-            <a:rPr lang="es-ES" sz="1100" kern="1200" dirty="0" err="1" smtClean="0"/>
-            <a:t>Difference</a:t>
-          </a:r>
-          <a:endParaRPr lang="es-ES" sz="1100" kern="1200" dirty="0"/>
-        </a:p>
-      </dsp:txBody>
-      <dsp:txXfrm>
-        <a:off x="0" y="699113"/>
-        <a:ext cx="4167777" cy="314961"/>
-      </dsp:txXfrm>
-    </dsp:sp>
-    <dsp:sp modelId="{A3166FD1-E3E1-46A0-8054-8C8615213FC8}">
-      <dsp:nvSpPr>
-        <dsp:cNvPr id="0" name=""/>
-        <dsp:cNvSpPr/>
-      </dsp:nvSpPr>
-      <dsp:spPr>
-        <a:xfrm>
-          <a:off x="0" y="1027393"/>
-          <a:ext cx="1332179" cy="1213462"/>
-        </a:xfrm>
-        <a:prstGeom prst="rect">
-          <a:avLst/>
-        </a:prstGeom>
-        <a:solidFill>
-          <a:schemeClr val="lt1">
-            <a:hueOff val="0"/>
-            <a:satOff val="0"/>
-            <a:lumOff val="0"/>
-            <a:alphaOff val="0"/>
-          </a:schemeClr>
-        </a:solidFill>
-        <a:ln w="15875" cap="rnd" cmpd="sng" algn="ctr">
-          <a:solidFill>
-            <a:schemeClr val="accent1">
-              <a:hueOff val="0"/>
-              <a:satOff val="0"/>
-              <a:lumOff val="0"/>
-              <a:alphaOff val="0"/>
-            </a:schemeClr>
-          </a:solidFill>
-          <a:prstDash val="solid"/>
-        </a:ln>
-        <a:effectLst/>
-      </dsp:spPr>
-      <dsp:style>
-        <a:lnRef idx="2">
-          <a:scrgbClr r="0" g="0" b="0"/>
-        </a:lnRef>
-        <a:fillRef idx="1">
-          <a:scrgbClr r="0" g="0" b="0"/>
-        </a:fillRef>
-        <a:effectRef idx="0">
-          <a:scrgbClr r="0" g="0" b="0"/>
-        </a:effectRef>
-        <a:fontRef idx="minor"/>
-      </dsp:style>
-      <dsp:txBody>
-        <a:bodyPr spcFirstLastPara="0" vert="horz" wrap="square" lIns="91440" tIns="91440" rIns="91440" bIns="91440" numCol="1" spcCol="1270" anchor="t" anchorCtr="0">
-          <a:noAutofit/>
-        </a:bodyPr>
-        <a:lstStyle/>
-        <a:p>
-          <a:pPr lvl="0" algn="l" defTabSz="1066800">
-            <a:lnSpc>
-              <a:spcPct val="90000"/>
-            </a:lnSpc>
-            <a:spcBef>
-              <a:spcPct val="0"/>
-            </a:spcBef>
-            <a:spcAft>
-              <a:spcPct val="35000"/>
-            </a:spcAft>
-          </a:pPr>
-          <a:r>
-            <a:rPr lang="es-ES" sz="2400" kern="1200" dirty="0" err="1" smtClean="0"/>
-            <a:t>Frame</a:t>
-          </a:r>
-          <a:r>
-            <a:rPr lang="es-ES" sz="2400" kern="1200" dirty="0" smtClean="0"/>
-            <a:t> 1</a:t>
-          </a:r>
-          <a:endParaRPr lang="es-ES" sz="2400" kern="1200" dirty="0"/>
-        </a:p>
-      </dsp:txBody>
-      <dsp:txXfrm>
-        <a:off x="0" y="1027393"/>
-        <a:ext cx="1332179" cy="1213462"/>
-      </dsp:txXfrm>
-    </dsp:sp>
-    <dsp:sp modelId="{04CC0CE8-796A-400A-AF96-B15EC4ED70F7}">
-      <dsp:nvSpPr>
-        <dsp:cNvPr id="0" name=""/>
-        <dsp:cNvSpPr/>
-      </dsp:nvSpPr>
-      <dsp:spPr>
-        <a:xfrm>
-          <a:off x="1332179" y="751606"/>
-          <a:ext cx="2993077" cy="629922"/>
-        </a:xfrm>
-        <a:prstGeom prst="rightArrow">
-          <a:avLst>
-            <a:gd name="adj1" fmla="val 50000"/>
-            <a:gd name="adj2" fmla="val 50000"/>
-          </a:avLst>
-        </a:prstGeom>
-        <a:solidFill>
-          <a:schemeClr val="accent1">
-            <a:hueOff val="0"/>
-            <a:satOff val="0"/>
-            <a:lumOff val="0"/>
-            <a:alphaOff val="0"/>
-          </a:schemeClr>
-        </a:solidFill>
-        <a:ln w="15875" cap="rnd" cmpd="sng" algn="ctr">
-          <a:solidFill>
-            <a:schemeClr val="lt1">
-              <a:hueOff val="0"/>
-              <a:satOff val="0"/>
-              <a:lumOff val="0"/>
-              <a:alphaOff val="0"/>
-            </a:schemeClr>
-          </a:solidFill>
-          <a:prstDash val="solid"/>
-        </a:ln>
-        <a:effectLst/>
-      </dsp:spPr>
-      <dsp:style>
-        <a:lnRef idx="2">
-          <a:scrgbClr r="0" g="0" b="0"/>
-        </a:lnRef>
-        <a:fillRef idx="1">
-          <a:scrgbClr r="0" g="0" b="0"/>
-        </a:fillRef>
-        <a:effectRef idx="0">
-          <a:scrgbClr r="0" g="0" b="0"/>
-        </a:effectRef>
-        <a:fontRef idx="minor">
-          <a:schemeClr val="lt1"/>
-        </a:fontRef>
-      </dsp:style>
-      <dsp:txBody>
-        <a:bodyPr spcFirstLastPara="0" vert="horz" wrap="square" lIns="41910" tIns="41910" rIns="254000" bIns="100000" numCol="1" spcCol="1270" anchor="ctr" anchorCtr="0">
-          <a:noAutofit/>
-        </a:bodyPr>
-        <a:lstStyle/>
-        <a:p>
-          <a:pPr lvl="0" algn="l" defTabSz="488950">
-            <a:lnSpc>
-              <a:spcPct val="90000"/>
-            </a:lnSpc>
-            <a:spcBef>
-              <a:spcPct val="0"/>
-            </a:spcBef>
-            <a:spcAft>
-              <a:spcPct val="35000"/>
-            </a:spcAft>
-          </a:pPr>
-          <a:r>
-            <a:rPr lang="es-ES" sz="1100" kern="1200" dirty="0" smtClean="0"/>
-            <a:t>Compute </a:t>
-          </a:r>
-          <a:r>
-            <a:rPr lang="es-ES" sz="1100" kern="1200" dirty="0" err="1" smtClean="0"/>
-            <a:t>Difference</a:t>
-          </a:r>
-          <a:endParaRPr lang="es-ES" sz="1100" kern="1200" dirty="0"/>
-        </a:p>
-      </dsp:txBody>
-      <dsp:txXfrm>
-        <a:off x="1332179" y="909087"/>
-        <a:ext cx="2835597" cy="314961"/>
-      </dsp:txXfrm>
-    </dsp:sp>
-    <dsp:sp modelId="{A89AFF3D-79BD-43DE-887E-2A4E81F7B2E2}">
-      <dsp:nvSpPr>
-        <dsp:cNvPr id="0" name=""/>
-        <dsp:cNvSpPr/>
-      </dsp:nvSpPr>
-      <dsp:spPr>
-        <a:xfrm>
-          <a:off x="1332179" y="1237367"/>
-          <a:ext cx="1332179" cy="1213462"/>
-        </a:xfrm>
-        <a:prstGeom prst="rect">
-          <a:avLst/>
-        </a:prstGeom>
-        <a:solidFill>
-          <a:schemeClr val="lt1">
-            <a:hueOff val="0"/>
-            <a:satOff val="0"/>
-            <a:lumOff val="0"/>
-            <a:alphaOff val="0"/>
-          </a:schemeClr>
-        </a:solidFill>
-        <a:ln w="15875" cap="rnd" cmpd="sng" algn="ctr">
-          <a:solidFill>
-            <a:schemeClr val="accent1">
-              <a:hueOff val="0"/>
-              <a:satOff val="0"/>
-              <a:lumOff val="0"/>
-              <a:alphaOff val="0"/>
-            </a:schemeClr>
-          </a:solidFill>
-          <a:prstDash val="solid"/>
-        </a:ln>
-        <a:effectLst/>
-      </dsp:spPr>
-      <dsp:style>
-        <a:lnRef idx="2">
-          <a:scrgbClr r="0" g="0" b="0"/>
-        </a:lnRef>
-        <a:fillRef idx="1">
-          <a:scrgbClr r="0" g="0" b="0"/>
-        </a:fillRef>
-        <a:effectRef idx="0">
-          <a:scrgbClr r="0" g="0" b="0"/>
-        </a:effectRef>
-        <a:fontRef idx="minor"/>
-      </dsp:style>
-      <dsp:txBody>
-        <a:bodyPr spcFirstLastPara="0" vert="horz" wrap="square" lIns="91440" tIns="91440" rIns="91440" bIns="91440" numCol="1" spcCol="1270" anchor="t" anchorCtr="0">
-          <a:noAutofit/>
-        </a:bodyPr>
-        <a:lstStyle/>
-        <a:p>
-          <a:pPr lvl="0" algn="l" defTabSz="1066800">
-            <a:lnSpc>
-              <a:spcPct val="90000"/>
-            </a:lnSpc>
-            <a:spcBef>
-              <a:spcPct val="0"/>
-            </a:spcBef>
-            <a:spcAft>
-              <a:spcPct val="35000"/>
-            </a:spcAft>
-          </a:pPr>
-          <a:r>
-            <a:rPr lang="es-ES" sz="2400" kern="1200" dirty="0" err="1" smtClean="0"/>
-            <a:t>Frame</a:t>
-          </a:r>
-          <a:r>
-            <a:rPr lang="es-ES" sz="2400" kern="1200" dirty="0" smtClean="0"/>
-            <a:t> 2</a:t>
-          </a:r>
-          <a:endParaRPr lang="es-ES" sz="2400" kern="1200" dirty="0"/>
-        </a:p>
-      </dsp:txBody>
-      <dsp:txXfrm>
-        <a:off x="1332179" y="1237367"/>
-        <a:ext cx="1332179" cy="1213462"/>
-      </dsp:txXfrm>
-    </dsp:sp>
-    <dsp:sp modelId="{64767A4A-738D-4555-8175-45549CA72A8A}">
-      <dsp:nvSpPr>
-        <dsp:cNvPr id="0" name=""/>
-        <dsp:cNvSpPr/>
-      </dsp:nvSpPr>
-      <dsp:spPr>
-        <a:xfrm>
-          <a:off x="2664358" y="961580"/>
-          <a:ext cx="1660898" cy="629922"/>
-        </a:xfrm>
-        <a:prstGeom prst="rightArrow">
-          <a:avLst>
-            <a:gd name="adj1" fmla="val 50000"/>
-            <a:gd name="adj2" fmla="val 50000"/>
-          </a:avLst>
-        </a:prstGeom>
-        <a:solidFill>
-          <a:schemeClr val="accent1">
-            <a:hueOff val="0"/>
-            <a:satOff val="0"/>
-            <a:lumOff val="0"/>
-            <a:alphaOff val="0"/>
-          </a:schemeClr>
-        </a:solidFill>
-        <a:ln w="15875" cap="rnd" cmpd="sng" algn="ctr">
-          <a:solidFill>
-            <a:schemeClr val="lt1">
-              <a:hueOff val="0"/>
-              <a:satOff val="0"/>
-              <a:lumOff val="0"/>
-              <a:alphaOff val="0"/>
-            </a:schemeClr>
-          </a:solidFill>
-          <a:prstDash val="solid"/>
-        </a:ln>
-        <a:effectLst/>
-      </dsp:spPr>
-      <dsp:style>
-        <a:lnRef idx="2">
-          <a:scrgbClr r="0" g="0" b="0"/>
-        </a:lnRef>
-        <a:fillRef idx="1">
-          <a:scrgbClr r="0" g="0" b="0"/>
-        </a:fillRef>
-        <a:effectRef idx="0">
-          <a:scrgbClr r="0" g="0" b="0"/>
-        </a:effectRef>
-        <a:fontRef idx="minor">
-          <a:schemeClr val="lt1"/>
-        </a:fontRef>
-      </dsp:style>
-      <dsp:txBody>
-        <a:bodyPr spcFirstLastPara="0" vert="horz" wrap="square" lIns="41910" tIns="41910" rIns="254000" bIns="100000" numCol="1" spcCol="1270" anchor="ctr" anchorCtr="0">
-          <a:noAutofit/>
-        </a:bodyPr>
-        <a:lstStyle/>
-        <a:p>
-          <a:pPr lvl="0" algn="l" defTabSz="488950">
-            <a:lnSpc>
-              <a:spcPct val="90000"/>
-            </a:lnSpc>
-            <a:spcBef>
-              <a:spcPct val="0"/>
-            </a:spcBef>
-            <a:spcAft>
-              <a:spcPct val="35000"/>
-            </a:spcAft>
-          </a:pPr>
-          <a:r>
-            <a:rPr lang="es-ES" sz="1100" kern="1200" dirty="0" smtClean="0"/>
-            <a:t>Compute </a:t>
-          </a:r>
-          <a:r>
-            <a:rPr lang="es-ES" sz="1100" kern="1200" dirty="0" err="1" smtClean="0"/>
-            <a:t>Difference</a:t>
-          </a:r>
-          <a:endParaRPr lang="es-ES" sz="1100" kern="1200" dirty="0"/>
-        </a:p>
-      </dsp:txBody>
-      <dsp:txXfrm>
-        <a:off x="2664358" y="1119061"/>
-        <a:ext cx="1503418" cy="314961"/>
-      </dsp:txXfrm>
-    </dsp:sp>
-    <dsp:sp modelId="{55580990-C586-4337-B3E2-F658C853F9DF}">
-      <dsp:nvSpPr>
-        <dsp:cNvPr id="0" name=""/>
-        <dsp:cNvSpPr/>
-      </dsp:nvSpPr>
-      <dsp:spPr>
-        <a:xfrm>
-          <a:off x="2664358" y="1447341"/>
-          <a:ext cx="1332179" cy="1195703"/>
-        </a:xfrm>
-        <a:prstGeom prst="rect">
-          <a:avLst/>
-        </a:prstGeom>
-        <a:solidFill>
-          <a:schemeClr val="lt1">
-            <a:hueOff val="0"/>
-            <a:satOff val="0"/>
-            <a:lumOff val="0"/>
-            <a:alphaOff val="0"/>
-          </a:schemeClr>
-        </a:solidFill>
-        <a:ln w="15875" cap="rnd" cmpd="sng" algn="ctr">
-          <a:solidFill>
-            <a:schemeClr val="accent1">
-              <a:hueOff val="0"/>
-              <a:satOff val="0"/>
-              <a:lumOff val="0"/>
-              <a:alphaOff val="0"/>
-            </a:schemeClr>
-          </a:solidFill>
-          <a:prstDash val="solid"/>
-        </a:ln>
-        <a:effectLst/>
-      </dsp:spPr>
-      <dsp:style>
-        <a:lnRef idx="2">
-          <a:scrgbClr r="0" g="0" b="0"/>
-        </a:lnRef>
-        <a:fillRef idx="1">
-          <a:scrgbClr r="0" g="0" b="0"/>
-        </a:fillRef>
-        <a:effectRef idx="0">
-          <a:scrgbClr r="0" g="0" b="0"/>
-        </a:effectRef>
-        <a:fontRef idx="minor"/>
-      </dsp:style>
-      <dsp:txBody>
-        <a:bodyPr spcFirstLastPara="0" vert="horz" wrap="square" lIns="91440" tIns="91440" rIns="91440" bIns="91440" numCol="1" spcCol="1270" anchor="t" anchorCtr="0">
-          <a:noAutofit/>
-        </a:bodyPr>
-        <a:lstStyle/>
-        <a:p>
-          <a:pPr lvl="0" algn="l" defTabSz="1066800">
-            <a:lnSpc>
-              <a:spcPct val="90000"/>
-            </a:lnSpc>
-            <a:spcBef>
-              <a:spcPct val="0"/>
-            </a:spcBef>
-            <a:spcAft>
-              <a:spcPct val="35000"/>
-            </a:spcAft>
-          </a:pPr>
-          <a:r>
-            <a:rPr lang="es-ES" sz="2400" kern="1200" dirty="0" err="1" smtClean="0"/>
-            <a:t>Frame</a:t>
-          </a:r>
-          <a:r>
-            <a:rPr lang="es-ES" sz="2400" kern="1200" dirty="0" smtClean="0"/>
-            <a:t> k</a:t>
-          </a:r>
-          <a:endParaRPr lang="es-ES" sz="2400" kern="1200" dirty="0"/>
-        </a:p>
-      </dsp:txBody>
-      <dsp:txXfrm>
-        <a:off x="2664358" y="1447341"/>
-        <a:ext cx="1332179" cy="1195703"/>
-      </dsp:txXfrm>
-    </dsp:sp>
   </dsp:spTree>
 </dsp:drawing>
 </file>
@@ -12893,6 +12404,44 @@
           </a:p>
         </p:txBody>
       </p:sp>
+      <p:sp>
+        <p:nvSpPr>
+          <p:cNvPr id="4" name="CuadroTexto 3"/>
+          <p:cNvSpPr txBox="1"/>
+          <p:nvPr/>
+        </p:nvSpPr>
+        <p:spPr>
+          <a:xfrm>
+            <a:off x="9806724" y="5966135"/>
+            <a:ext cx="1696298" cy="646331"/>
+          </a:xfrm>
+          <a:prstGeom prst="rect">
+            <a:avLst/>
+          </a:prstGeom>
+          <a:noFill/>
+        </p:spPr>
+        <p:txBody>
+          <a:bodyPr wrap="none" rtlCol="0">
+            <a:spAutoFit/>
+          </a:bodyPr>
+          <a:lstStyle/>
+          <a:p>
+            <a:pPr algn="r"/>
+            <a:r>
+              <a:rPr lang="en-US" dirty="0" smtClean="0"/>
+              <a:t>Cristian Muriel</a:t>
+            </a:r>
+          </a:p>
+          <a:p>
+            <a:pPr algn="r"/>
+            <a:r>
+              <a:rPr lang="en-US" dirty="0" smtClean="0"/>
+              <a:t>Guillem Pascual</a:t>
+            </a:r>
+            <a:endParaRPr lang="en-US" dirty="0"/>
+          </a:p>
+        </p:txBody>
+      </p:sp>
     </p:spTree>
     <p:extLst>
       <p:ext uri="{BB962C8B-B14F-4D97-AF65-F5344CB8AC3E}">
@@ -13323,8 +12872,8 @@
           </a:p>
         </p:txBody>
       </p:sp>
-      <mc:AlternateContent xmlns:mc="http://schemas.openxmlformats.org/markup-compatibility/2006">
-        <mc:Choice xmlns:a14="http://schemas.microsoft.com/office/drawing/2010/main" Requires="a14">
+      <mc:AlternateContent xmlns:mc="http://schemas.openxmlformats.org/markup-compatibility/2006" xmlns:a14="http://schemas.microsoft.com/office/drawing/2010/main">
+        <mc:Choice Requires="a14">
           <p:sp>
             <p:nvSpPr>
               <p:cNvPr id="8" name="CuadroTexto 7"/>
@@ -13349,11 +12898,7 @@
               <a:p>
                 <a:r>
                   <a:rPr lang="es-ES" sz="3200" dirty="0" smtClean="0"/>
-                  <a:t>BG’ = BG * (1 </a:t>
-                </a:r>
-                <a:r>
-                  <a:rPr lang="es-ES" sz="3200" dirty="0" smtClean="0"/>
-                  <a:t>– </a:t>
+                  <a:t>BG’ = BG * (1 – </a:t>
                 </a:r>
                 <a14:m>
                   <m:oMath xmlns:m="http://schemas.openxmlformats.org/officeDocument/2006/math">
@@ -13368,11 +12913,7 @@
                 </a14:m>
                 <a:r>
                   <a:rPr lang="es-ES" sz="3200" dirty="0" smtClean="0"/>
-                  <a:t>) </a:t>
-                </a:r>
-                <a:r>
-                  <a:rPr lang="es-ES" sz="3200" dirty="0" smtClean="0"/>
-                  <a:t>+</a:t>
+                  <a:t>) +</a:t>
                 </a:r>
               </a:p>
               <a:p>
@@ -13404,7 +12945,7 @@
             </p:txBody>
           </p:sp>
         </mc:Choice>
-        <mc:Fallback>
+        <mc:Fallback xmlns="">
           <p:sp>
             <p:nvSpPr>
               <p:cNvPr id="8" name="CuadroTexto 7"/>
@@ -13477,8 +13018,8 @@
           </a:p>
         </p:txBody>
       </p:sp>
-      <mc:AlternateContent xmlns:mc="http://schemas.openxmlformats.org/markup-compatibility/2006">
-        <mc:Choice xmlns:a14="http://schemas.microsoft.com/office/drawing/2010/main" Requires="a14">
+      <mc:AlternateContent xmlns:mc="http://schemas.openxmlformats.org/markup-compatibility/2006" xmlns:a14="http://schemas.microsoft.com/office/drawing/2010/main">
+        <mc:Choice Requires="a14">
           <p:sp>
             <p:nvSpPr>
               <p:cNvPr id="3" name="CuadroTexto 2"/>
@@ -13521,7 +13062,7 @@
             </p:txBody>
           </p:sp>
         </mc:Choice>
-        <mc:Fallback>
+        <mc:Fallback xmlns="">
           <p:sp>
             <p:nvSpPr>
               <p:cNvPr id="3" name="CuadroTexto 2"/>

</xml_diff>